<commit_message>
Formulierungen auf der zweiten Folie angepasst.
</commit_message>
<xml_diff>
--- a/assn1/Assignment1.pptx
+++ b/assn1/Assignment1.pptx
@@ -214,7 +214,7 @@
           <a:p>
             <a:fld id="{28041F83-72B6-46B8-A374-CFD5BC803FAE}" type="datetimeFigureOut">
               <a:rPr lang="en-US" smtClean="0"/>
-              <a:t>2/6/2021</a:t>
+              <a:t>2/9/2021</a:t>
             </a:fld>
             <a:endParaRPr lang="en-US"/>
           </a:p>
@@ -3278,6 +3278,14 @@
             </a:r>
             <a:r>
               <a:rPr lang="en-US" sz="2400" dirty="0" err="1"/>
+              <a:t>üblicherweise</a:t>
+            </a:r>
+            <a:r>
+              <a:rPr lang="en-US" sz="2400" dirty="0"/>
+              <a:t> </a:t>
+            </a:r>
+            <a:r>
+              <a:rPr lang="en-US" sz="2400" dirty="0" err="1"/>
               <a:t>nicht</a:t>
             </a:r>
             <a:endParaRPr lang="en-US" sz="2400" dirty="0"/>
@@ -3341,11 +3349,11 @@
             </a:r>
             <a:r>
               <a:rPr lang="en-US" sz="2400" dirty="0"/>
-              <a:t> </a:t>
+              <a:t> oft </a:t>
             </a:r>
             <a:r>
               <a:rPr lang="en-US" sz="2400" dirty="0" err="1"/>
-              <a:t>notwendig</a:t>
+              <a:t>hilfreich</a:t>
             </a:r>
             <a:endParaRPr lang="en-US" sz="2400" dirty="0"/>
           </a:p>
@@ -3380,6 +3388,14 @@
             </a:r>
             <a:r>
               <a:rPr lang="en-US" sz="2400" dirty="0" err="1"/>
+              <a:t>dafür</a:t>
+            </a:r>
+            <a:r>
+              <a:rPr lang="en-US" sz="2400" dirty="0"/>
+              <a:t> </a:t>
+            </a:r>
+            <a:r>
+              <a:rPr lang="en-US" sz="2400" dirty="0" err="1"/>
               <a:t>individuell</a:t>
             </a:r>
             <a:r>
@@ -3413,6 +3429,14 @@
             <a:r>
               <a:rPr lang="en-US" sz="2400" dirty="0" err="1"/>
               <a:t>unterscheiden</a:t>
+            </a:r>
+            <a:r>
+              <a:rPr lang="en-US" sz="2400" dirty="0"/>
+              <a:t> </a:t>
+            </a:r>
+            <a:r>
+              <a:rPr lang="en-US" sz="2400" dirty="0" err="1"/>
+              <a:t>können</a:t>
             </a:r>
             <a:endParaRPr lang="en-US" sz="2400" dirty="0"/>
           </a:p>
@@ -3459,7 +3483,7 @@
             </a:r>
             <a:r>
               <a:rPr lang="en-US" sz="2400" dirty="0"/>
-              <a:t> </a:t>
+              <a:t> in der Praxis </a:t>
             </a:r>
             <a:r>
               <a:rPr lang="en-US" sz="2400" dirty="0" err="1"/>

</xml_diff>